<commit_message>
Fixing a bug in DeepPurpose data analysis and updating figures
</commit_message>
<xml_diff>
--- a/Images/SI2.pptx
+++ b/Images/SI2.pptx
@@ -197,7 +197,7 @@
           <a:p>
             <a:fld id="{0C45F89B-D0D3-4AC5-836F-869636F86470}" type="datetimeFigureOut">
               <a:rPr lang="en-US" smtClean="0"/>
-              <a:t>7/16/2021</a:t>
+              <a:t>10/1/2021</a:t>
             </a:fld>
             <a:endParaRPr lang="en-US"/>
           </a:p>
@@ -595,7 +595,7 @@
           <a:p>
             <a:fld id="{1516511B-B61A-47A9-97DC-35FBB5E54714}" type="datetimeFigureOut">
               <a:rPr lang="en-US" smtClean="0"/>
-              <a:t>7/16/2021</a:t>
+              <a:t>10/1/2021</a:t>
             </a:fld>
             <a:endParaRPr lang="en-US"/>
           </a:p>
@@ -765,7 +765,7 @@
           <a:p>
             <a:fld id="{1516511B-B61A-47A9-97DC-35FBB5E54714}" type="datetimeFigureOut">
               <a:rPr lang="en-US" smtClean="0"/>
-              <a:t>7/16/2021</a:t>
+              <a:t>10/1/2021</a:t>
             </a:fld>
             <a:endParaRPr lang="en-US"/>
           </a:p>
@@ -945,7 +945,7 @@
           <a:p>
             <a:fld id="{1516511B-B61A-47A9-97DC-35FBB5E54714}" type="datetimeFigureOut">
               <a:rPr lang="en-US" smtClean="0"/>
-              <a:t>7/16/2021</a:t>
+              <a:t>10/1/2021</a:t>
             </a:fld>
             <a:endParaRPr lang="en-US"/>
           </a:p>
@@ -1115,7 +1115,7 @@
           <a:p>
             <a:fld id="{1516511B-B61A-47A9-97DC-35FBB5E54714}" type="datetimeFigureOut">
               <a:rPr lang="en-US" smtClean="0"/>
-              <a:t>7/16/2021</a:t>
+              <a:t>10/1/2021</a:t>
             </a:fld>
             <a:endParaRPr lang="en-US"/>
           </a:p>
@@ -1359,7 +1359,7 @@
           <a:p>
             <a:fld id="{1516511B-B61A-47A9-97DC-35FBB5E54714}" type="datetimeFigureOut">
               <a:rPr lang="en-US" smtClean="0"/>
-              <a:t>7/16/2021</a:t>
+              <a:t>10/1/2021</a:t>
             </a:fld>
             <a:endParaRPr lang="en-US"/>
           </a:p>
@@ -1591,7 +1591,7 @@
           <a:p>
             <a:fld id="{1516511B-B61A-47A9-97DC-35FBB5E54714}" type="datetimeFigureOut">
               <a:rPr lang="en-US" smtClean="0"/>
-              <a:t>7/16/2021</a:t>
+              <a:t>10/1/2021</a:t>
             </a:fld>
             <a:endParaRPr lang="en-US"/>
           </a:p>
@@ -1958,7 +1958,7 @@
           <a:p>
             <a:fld id="{1516511B-B61A-47A9-97DC-35FBB5E54714}" type="datetimeFigureOut">
               <a:rPr lang="en-US" smtClean="0"/>
-              <a:t>7/16/2021</a:t>
+              <a:t>10/1/2021</a:t>
             </a:fld>
             <a:endParaRPr lang="en-US"/>
           </a:p>
@@ -2076,7 +2076,7 @@
           <a:p>
             <a:fld id="{1516511B-B61A-47A9-97DC-35FBB5E54714}" type="datetimeFigureOut">
               <a:rPr lang="en-US" smtClean="0"/>
-              <a:t>7/16/2021</a:t>
+              <a:t>10/1/2021</a:t>
             </a:fld>
             <a:endParaRPr lang="en-US"/>
           </a:p>
@@ -2171,7 +2171,7 @@
           <a:p>
             <a:fld id="{1516511B-B61A-47A9-97DC-35FBB5E54714}" type="datetimeFigureOut">
               <a:rPr lang="en-US" smtClean="0"/>
-              <a:t>7/16/2021</a:t>
+              <a:t>10/1/2021</a:t>
             </a:fld>
             <a:endParaRPr lang="en-US"/>
           </a:p>
@@ -2448,7 +2448,7 @@
           <a:p>
             <a:fld id="{1516511B-B61A-47A9-97DC-35FBB5E54714}" type="datetimeFigureOut">
               <a:rPr lang="en-US" smtClean="0"/>
-              <a:t>7/16/2021</a:t>
+              <a:t>10/1/2021</a:t>
             </a:fld>
             <a:endParaRPr lang="en-US"/>
           </a:p>
@@ -2705,7 +2705,7 @@
           <a:p>
             <a:fld id="{1516511B-B61A-47A9-97DC-35FBB5E54714}" type="datetimeFigureOut">
               <a:rPr lang="en-US" smtClean="0"/>
-              <a:t>7/16/2021</a:t>
+              <a:t>10/1/2021</a:t>
             </a:fld>
             <a:endParaRPr lang="en-US"/>
           </a:p>
@@ -2918,7 +2918,7 @@
           <a:p>
             <a:fld id="{1516511B-B61A-47A9-97DC-35FBB5E54714}" type="datetimeFigureOut">
               <a:rPr lang="en-US" smtClean="0"/>
-              <a:t>7/16/2021</a:t>
+              <a:t>10/1/2021</a:t>
             </a:fld>
             <a:endParaRPr lang="en-US"/>
           </a:p>
@@ -3454,7 +3454,7 @@
           <p:spPr>
             <a:xfrm>
               <a:off x="4757810" y="1197626"/>
-              <a:ext cx="1352560" cy="276999"/>
+              <a:ext cx="1352560" cy="163953"/>
             </a:xfrm>
             <a:prstGeom prst="rect">
               <a:avLst/>
@@ -3472,7 +3472,7 @@
                   <a:latin typeface="Times New Roman" panose="02020603050405020304" pitchFamily="18" charset="0"/>
                   <a:cs typeface="Times New Roman" panose="02020603050405020304" pitchFamily="18" charset="0"/>
                 </a:rPr>
-                <a:t>DrugBank</a:t>
+                <a:t>DrugBank (1)</a:t>
               </a:r>
             </a:p>
           </p:txBody>
@@ -3492,7 +3492,7 @@
           <p:spPr>
             <a:xfrm>
               <a:off x="4757810" y="1583328"/>
-              <a:ext cx="1731222" cy="276999"/>
+              <a:ext cx="1731222" cy="163953"/>
             </a:xfrm>
             <a:prstGeom prst="rect">
               <a:avLst/>
@@ -3510,7 +3510,7 @@
                   <a:latin typeface="Times New Roman" panose="02020603050405020304" pitchFamily="18" charset="0"/>
                   <a:cs typeface="Times New Roman" panose="02020603050405020304" pitchFamily="18" charset="0"/>
                 </a:rPr>
-                <a:t>DrugBank in BindingDB</a:t>
+                <a:t>DrugBank in BindingDB (2)</a:t>
               </a:r>
             </a:p>
           </p:txBody>
@@ -3530,7 +3530,7 @@
           <p:spPr>
             <a:xfrm>
               <a:off x="4757810" y="1906981"/>
-              <a:ext cx="1731222" cy="276999"/>
+              <a:ext cx="1731222" cy="163953"/>
             </a:xfrm>
             <a:prstGeom prst="rect">
               <a:avLst/>
@@ -3548,7 +3548,7 @@
                   <a:latin typeface="Times New Roman" panose="02020603050405020304" pitchFamily="18" charset="0"/>
                   <a:cs typeface="Times New Roman" panose="02020603050405020304" pitchFamily="18" charset="0"/>
                 </a:rPr>
-                <a:t>NCFD in BindingDB</a:t>
+                <a:t>NCFD in BindingDB (3)</a:t>
               </a:r>
             </a:p>
           </p:txBody>
@@ -3568,7 +3568,7 @@
           <p:spPr>
             <a:xfrm>
               <a:off x="4757810" y="2277287"/>
-              <a:ext cx="1731222" cy="276999"/>
+              <a:ext cx="1731222" cy="163953"/>
             </a:xfrm>
             <a:prstGeom prst="rect">
               <a:avLst/>
@@ -3586,324 +3586,12 @@
                   <a:latin typeface="Times New Roman" panose="02020603050405020304" pitchFamily="18" charset="0"/>
                   <a:cs typeface="Times New Roman" panose="02020603050405020304" pitchFamily="18" charset="0"/>
                 </a:rPr>
-                <a:t>NCFD in DTC</a:t>
+                <a:t>NCFD in DTC (4)</a:t>
               </a:r>
             </a:p>
           </p:txBody>
         </p:sp>
       </p:grpSp>
-      <p:sp>
-        <p:nvSpPr>
-          <p:cNvPr id="2" name="Rectangle 1">
-            <a:extLst>
-              <a:ext uri="{FF2B5EF4-FFF2-40B4-BE49-F238E27FC236}">
-                <a16:creationId xmlns:a16="http://schemas.microsoft.com/office/drawing/2014/main" id="{6610FD95-EEB4-4D50-A6AA-0C67D3A765CA}"/>
-              </a:ext>
-            </a:extLst>
-          </p:cNvPr>
-          <p:cNvSpPr/>
-          <p:nvPr/>
-        </p:nvSpPr>
-        <p:spPr>
-          <a:xfrm>
-            <a:off x="3071973" y="5866544"/>
-            <a:ext cx="297951" cy="113016"/>
-          </a:xfrm>
-          <a:prstGeom prst="rect">
-            <a:avLst/>
-          </a:prstGeom>
-          <a:solidFill>
-            <a:srgbClr val="F5A3B7"/>
-          </a:solidFill>
-          <a:ln>
-            <a:noFill/>
-          </a:ln>
-        </p:spPr>
-        <p:style>
-          <a:lnRef idx="2">
-            <a:schemeClr val="accent1">
-              <a:shade val="50000"/>
-            </a:schemeClr>
-          </a:lnRef>
-          <a:fillRef idx="1">
-            <a:schemeClr val="accent1"/>
-          </a:fillRef>
-          <a:effectRef idx="0">
-            <a:schemeClr val="accent1"/>
-          </a:effectRef>
-          <a:fontRef idx="minor">
-            <a:schemeClr val="lt1"/>
-          </a:fontRef>
-        </p:style>
-        <p:txBody>
-          <a:bodyPr rtlCol="0" anchor="ctr"/>
-          <a:lstStyle/>
-          <a:p>
-            <a:pPr algn="ctr"/>
-            <a:endParaRPr lang="en-US"/>
-          </a:p>
-        </p:txBody>
-      </p:sp>
-      <p:sp>
-        <p:nvSpPr>
-          <p:cNvPr id="3" name="Rectangle 2">
-            <a:extLst>
-              <a:ext uri="{FF2B5EF4-FFF2-40B4-BE49-F238E27FC236}">
-                <a16:creationId xmlns:a16="http://schemas.microsoft.com/office/drawing/2014/main" id="{F2144B19-8167-4DA0-B398-FCF5D7E4E31F}"/>
-              </a:ext>
-            </a:extLst>
-          </p:cNvPr>
-          <p:cNvSpPr/>
-          <p:nvPr/>
-        </p:nvSpPr>
-        <p:spPr>
-          <a:xfrm>
-            <a:off x="4068566" y="3079556"/>
-            <a:ext cx="226032" cy="92467"/>
-          </a:xfrm>
-          <a:prstGeom prst="rect">
-            <a:avLst/>
-          </a:prstGeom>
-          <a:solidFill>
-            <a:srgbClr val="ABAA8C"/>
-          </a:solidFill>
-          <a:ln>
-            <a:noFill/>
-          </a:ln>
-        </p:spPr>
-        <p:style>
-          <a:lnRef idx="2">
-            <a:schemeClr val="accent1">
-              <a:shade val="50000"/>
-            </a:schemeClr>
-          </a:lnRef>
-          <a:fillRef idx="1">
-            <a:schemeClr val="accent1"/>
-          </a:fillRef>
-          <a:effectRef idx="0">
-            <a:schemeClr val="accent1"/>
-          </a:effectRef>
-          <a:fontRef idx="minor">
-            <a:schemeClr val="lt1"/>
-          </a:fontRef>
-        </p:style>
-        <p:txBody>
-          <a:bodyPr rtlCol="0" anchor="ctr"/>
-          <a:lstStyle/>
-          <a:p>
-            <a:pPr algn="ctr"/>
-            <a:endParaRPr lang="en-US"/>
-          </a:p>
-        </p:txBody>
-      </p:sp>
-      <p:sp>
-        <p:nvSpPr>
-          <p:cNvPr id="12" name="Rectangle 11">
-            <a:extLst>
-              <a:ext uri="{FF2B5EF4-FFF2-40B4-BE49-F238E27FC236}">
-                <a16:creationId xmlns:a16="http://schemas.microsoft.com/office/drawing/2014/main" id="{A731BF9C-D42B-45D7-91DF-7B1F25E8F9A7}"/>
-              </a:ext>
-            </a:extLst>
-          </p:cNvPr>
-          <p:cNvSpPr/>
-          <p:nvPr/>
-        </p:nvSpPr>
-        <p:spPr>
-          <a:xfrm>
-            <a:off x="5197426" y="1834863"/>
-            <a:ext cx="288974" cy="229889"/>
-          </a:xfrm>
-          <a:prstGeom prst="rect">
-            <a:avLst/>
-          </a:prstGeom>
-          <a:solidFill>
-            <a:srgbClr val="B1E1B7"/>
-          </a:solidFill>
-          <a:ln>
-            <a:noFill/>
-          </a:ln>
-        </p:spPr>
-        <p:style>
-          <a:lnRef idx="2">
-            <a:schemeClr val="accent1">
-              <a:shade val="50000"/>
-            </a:schemeClr>
-          </a:lnRef>
-          <a:fillRef idx="1">
-            <a:schemeClr val="accent1"/>
-          </a:fillRef>
-          <a:effectRef idx="0">
-            <a:schemeClr val="accent1"/>
-          </a:effectRef>
-          <a:fontRef idx="minor">
-            <a:schemeClr val="lt1"/>
-          </a:fontRef>
-        </p:style>
-        <p:txBody>
-          <a:bodyPr rtlCol="0" anchor="ctr"/>
-          <a:lstStyle/>
-          <a:p>
-            <a:pPr algn="ctr"/>
-            <a:endParaRPr lang="en-US"/>
-          </a:p>
-        </p:txBody>
-      </p:sp>
-      <p:sp>
-        <p:nvSpPr>
-          <p:cNvPr id="13" name="Rectangle 12">
-            <a:extLst>
-              <a:ext uri="{FF2B5EF4-FFF2-40B4-BE49-F238E27FC236}">
-                <a16:creationId xmlns:a16="http://schemas.microsoft.com/office/drawing/2014/main" id="{41875592-5C05-4E91-B866-7784CC453C7A}"/>
-              </a:ext>
-            </a:extLst>
-          </p:cNvPr>
-          <p:cNvSpPr/>
-          <p:nvPr/>
-        </p:nvSpPr>
-        <p:spPr>
-          <a:xfrm flipH="1">
-            <a:off x="5589141" y="3079556"/>
-            <a:ext cx="226031" cy="92467"/>
-          </a:xfrm>
-          <a:prstGeom prst="rect">
-            <a:avLst/>
-          </a:prstGeom>
-          <a:solidFill>
-            <a:srgbClr val="D0E178"/>
-          </a:solidFill>
-          <a:ln>
-            <a:noFill/>
-          </a:ln>
-        </p:spPr>
-        <p:style>
-          <a:lnRef idx="2">
-            <a:schemeClr val="accent1">
-              <a:shade val="50000"/>
-            </a:schemeClr>
-          </a:lnRef>
-          <a:fillRef idx="1">
-            <a:schemeClr val="accent1"/>
-          </a:fillRef>
-          <a:effectRef idx="0">
-            <a:schemeClr val="accent1"/>
-          </a:effectRef>
-          <a:fontRef idx="minor">
-            <a:schemeClr val="lt1"/>
-          </a:fontRef>
-        </p:style>
-        <p:txBody>
-          <a:bodyPr rtlCol="0" anchor="ctr"/>
-          <a:lstStyle/>
-          <a:p>
-            <a:pPr algn="ctr"/>
-            <a:endParaRPr lang="en-US"/>
-          </a:p>
-        </p:txBody>
-      </p:sp>
-      <p:sp>
-        <p:nvSpPr>
-          <p:cNvPr id="21" name="Rectangle 20">
-            <a:extLst>
-              <a:ext uri="{FF2B5EF4-FFF2-40B4-BE49-F238E27FC236}">
-                <a16:creationId xmlns:a16="http://schemas.microsoft.com/office/drawing/2014/main" id="{3F60F9A7-EFE5-4A6F-A195-78CDB399AF39}"/>
-              </a:ext>
-            </a:extLst>
-          </p:cNvPr>
-          <p:cNvSpPr/>
-          <p:nvPr/>
-        </p:nvSpPr>
-        <p:spPr>
-          <a:xfrm>
-            <a:off x="6052083" y="3590245"/>
-            <a:ext cx="288974" cy="229889"/>
-          </a:xfrm>
-          <a:prstGeom prst="rect">
-            <a:avLst/>
-          </a:prstGeom>
-          <a:solidFill>
-            <a:srgbClr val="FFF3A3"/>
-          </a:solidFill>
-          <a:ln>
-            <a:noFill/>
-          </a:ln>
-        </p:spPr>
-        <p:style>
-          <a:lnRef idx="2">
-            <a:schemeClr val="accent1">
-              <a:shade val="50000"/>
-            </a:schemeClr>
-          </a:lnRef>
-          <a:fillRef idx="1">
-            <a:schemeClr val="accent1"/>
-          </a:fillRef>
-          <a:effectRef idx="0">
-            <a:schemeClr val="accent1"/>
-          </a:effectRef>
-          <a:fontRef idx="minor">
-            <a:schemeClr val="lt1"/>
-          </a:fontRef>
-        </p:style>
-        <p:txBody>
-          <a:bodyPr rtlCol="0" anchor="ctr"/>
-          <a:lstStyle/>
-          <a:p>
-            <a:pPr algn="ctr"/>
-            <a:endParaRPr lang="en-US"/>
-          </a:p>
-        </p:txBody>
-      </p:sp>
-      <p:sp>
-        <p:nvSpPr>
-          <p:cNvPr id="22" name="Rectangle 21">
-            <a:extLst>
-              <a:ext uri="{FF2B5EF4-FFF2-40B4-BE49-F238E27FC236}">
-                <a16:creationId xmlns:a16="http://schemas.microsoft.com/office/drawing/2014/main" id="{28B9642B-FD64-475C-8283-1A0052695D45}"/>
-              </a:ext>
-            </a:extLst>
-          </p:cNvPr>
-          <p:cNvSpPr/>
-          <p:nvPr/>
-        </p:nvSpPr>
-        <p:spPr>
-          <a:xfrm flipV="1">
-            <a:off x="5289893" y="3475756"/>
-            <a:ext cx="288974" cy="114488"/>
-          </a:xfrm>
-          <a:prstGeom prst="rect">
-            <a:avLst/>
-          </a:prstGeom>
-          <a:solidFill>
-            <a:srgbClr val="7DBB98"/>
-          </a:solidFill>
-          <a:ln>
-            <a:noFill/>
-          </a:ln>
-        </p:spPr>
-        <p:style>
-          <a:lnRef idx="2">
-            <a:schemeClr val="accent1">
-              <a:shade val="50000"/>
-            </a:schemeClr>
-          </a:lnRef>
-          <a:fillRef idx="1">
-            <a:schemeClr val="accent1"/>
-          </a:fillRef>
-          <a:effectRef idx="0">
-            <a:schemeClr val="accent1"/>
-          </a:effectRef>
-          <a:fontRef idx="minor">
-            <a:schemeClr val="lt1"/>
-          </a:fontRef>
-        </p:style>
-        <p:txBody>
-          <a:bodyPr rtlCol="0" anchor="ctr"/>
-          <a:lstStyle/>
-          <a:p>
-            <a:pPr algn="ctr"/>
-            <a:endParaRPr lang="en-US"/>
-          </a:p>
-        </p:txBody>
-      </p:sp>
     </p:spTree>
     <p:extLst>
       <p:ext uri="{BB962C8B-B14F-4D97-AF65-F5344CB8AC3E}">

</xml_diff>